<commit_message>
[ref] Update ppt, testapp
</commit_message>
<xml_diff>
--- a/Document/PharmSyrupUltra_Firmware_v1.2.1.pptx
+++ b/Document/PharmSyrupUltra_Firmware_v1.2.1.pptx
@@ -265,7 +265,7 @@
           <a:p>
             <a:fld id="{18515E95-3EBF-43A9-A284-202A7AA22F30}" type="datetimeFigureOut">
               <a:rPr lang="ko-KR" altLang="en-US" smtClean="0"/>
-              <a:t>2024-12-12</a:t>
+              <a:t>2025-01-28</a:t>
             </a:fld>
             <a:endParaRPr lang="ko-KR" altLang="en-US"/>
           </a:p>
@@ -463,7 +463,7 @@
           <a:p>
             <a:fld id="{18515E95-3EBF-43A9-A284-202A7AA22F30}" type="datetimeFigureOut">
               <a:rPr lang="ko-KR" altLang="en-US" smtClean="0"/>
-              <a:t>2024-12-12</a:t>
+              <a:t>2025-01-28</a:t>
             </a:fld>
             <a:endParaRPr lang="ko-KR" altLang="en-US"/>
           </a:p>
@@ -671,7 +671,7 @@
           <a:p>
             <a:fld id="{18515E95-3EBF-43A9-A284-202A7AA22F30}" type="datetimeFigureOut">
               <a:rPr lang="ko-KR" altLang="en-US" smtClean="0"/>
-              <a:t>2024-12-12</a:t>
+              <a:t>2025-01-28</a:t>
             </a:fld>
             <a:endParaRPr lang="ko-KR" altLang="en-US"/>
           </a:p>
@@ -869,7 +869,7 @@
           <a:p>
             <a:fld id="{18515E95-3EBF-43A9-A284-202A7AA22F30}" type="datetimeFigureOut">
               <a:rPr lang="ko-KR" altLang="en-US" smtClean="0"/>
-              <a:t>2024-12-12</a:t>
+              <a:t>2025-01-28</a:t>
             </a:fld>
             <a:endParaRPr lang="ko-KR" altLang="en-US"/>
           </a:p>
@@ -1144,7 +1144,7 @@
           <a:p>
             <a:fld id="{18515E95-3EBF-43A9-A284-202A7AA22F30}" type="datetimeFigureOut">
               <a:rPr lang="ko-KR" altLang="en-US" smtClean="0"/>
-              <a:t>2024-12-12</a:t>
+              <a:t>2025-01-28</a:t>
             </a:fld>
             <a:endParaRPr lang="ko-KR" altLang="en-US"/>
           </a:p>
@@ -1409,7 +1409,7 @@
           <a:p>
             <a:fld id="{18515E95-3EBF-43A9-A284-202A7AA22F30}" type="datetimeFigureOut">
               <a:rPr lang="ko-KR" altLang="en-US" smtClean="0"/>
-              <a:t>2024-12-12</a:t>
+              <a:t>2025-01-28</a:t>
             </a:fld>
             <a:endParaRPr lang="ko-KR" altLang="en-US"/>
           </a:p>
@@ -1821,7 +1821,7 @@
           <a:p>
             <a:fld id="{18515E95-3EBF-43A9-A284-202A7AA22F30}" type="datetimeFigureOut">
               <a:rPr lang="ko-KR" altLang="en-US" smtClean="0"/>
-              <a:t>2024-12-12</a:t>
+              <a:t>2025-01-28</a:t>
             </a:fld>
             <a:endParaRPr lang="ko-KR" altLang="en-US"/>
           </a:p>
@@ -1962,7 +1962,7 @@
           <a:p>
             <a:fld id="{18515E95-3EBF-43A9-A284-202A7AA22F30}" type="datetimeFigureOut">
               <a:rPr lang="ko-KR" altLang="en-US" smtClean="0"/>
-              <a:t>2024-12-12</a:t>
+              <a:t>2025-01-28</a:t>
             </a:fld>
             <a:endParaRPr lang="ko-KR" altLang="en-US"/>
           </a:p>
@@ -2075,7 +2075,7 @@
           <a:p>
             <a:fld id="{18515E95-3EBF-43A9-A284-202A7AA22F30}" type="datetimeFigureOut">
               <a:rPr lang="ko-KR" altLang="en-US" smtClean="0"/>
-              <a:t>2024-12-12</a:t>
+              <a:t>2025-01-28</a:t>
             </a:fld>
             <a:endParaRPr lang="ko-KR" altLang="en-US"/>
           </a:p>
@@ -2386,7 +2386,7 @@
           <a:p>
             <a:fld id="{18515E95-3EBF-43A9-A284-202A7AA22F30}" type="datetimeFigureOut">
               <a:rPr lang="ko-KR" altLang="en-US" smtClean="0"/>
-              <a:t>2024-12-12</a:t>
+              <a:t>2025-01-28</a:t>
             </a:fld>
             <a:endParaRPr lang="ko-KR" altLang="en-US"/>
           </a:p>
@@ -2674,7 +2674,7 @@
           <a:p>
             <a:fld id="{18515E95-3EBF-43A9-A284-202A7AA22F30}" type="datetimeFigureOut">
               <a:rPr lang="ko-KR" altLang="en-US" smtClean="0"/>
-              <a:t>2024-12-12</a:t>
+              <a:t>2025-01-28</a:t>
             </a:fld>
             <a:endParaRPr lang="ko-KR" altLang="en-US"/>
           </a:p>
@@ -2915,7 +2915,7 @@
           <a:p>
             <a:fld id="{18515E95-3EBF-43A9-A284-202A7AA22F30}" type="datetimeFigureOut">
               <a:rPr lang="ko-KR" altLang="en-US" smtClean="0"/>
-              <a:t>2024-12-12</a:t>
+              <a:t>2025-01-28</a:t>
             </a:fld>
             <a:endParaRPr lang="ko-KR" altLang="en-US"/>
           </a:p>
@@ -4913,7 +4913,7 @@
                   <a:srgbClr val="FF0000"/>
                 </a:solidFill>
               </a:rPr>
-              <a:t>TO-BE, v1.2.0</a:t>
+              <a:t>TO-BE, v1.2.1</a:t>
             </a:r>
             <a:r>
               <a:rPr lang="en-US" altLang="ko-KR" sz="3000" dirty="0"/>
@@ -5236,6 +5236,174 @@
           </a:p>
         </p:txBody>
       </p:sp>
+      <p:cxnSp>
+        <p:nvCxnSpPr>
+          <p:cNvPr id="7" name="직선 연결선 6">
+            <a:extLst>
+              <a:ext uri="{FF2B5EF4-FFF2-40B4-BE49-F238E27FC236}">
+                <a16:creationId xmlns:a16="http://schemas.microsoft.com/office/drawing/2014/main" id="{428113A3-C0F5-BDA5-85C9-C9E151D4E9CD}"/>
+              </a:ext>
+            </a:extLst>
+          </p:cNvPr>
+          <p:cNvCxnSpPr/>
+          <p:nvPr/>
+        </p:nvCxnSpPr>
+        <p:spPr>
+          <a:xfrm flipV="1">
+            <a:off x="1754538" y="2771774"/>
+            <a:ext cx="350044" cy="253785"/>
+          </a:xfrm>
+          <a:prstGeom prst="line">
+            <a:avLst/>
+          </a:prstGeom>
+          <a:ln>
+            <a:solidFill>
+              <a:srgbClr val="FF0000"/>
+            </a:solidFill>
+          </a:ln>
+        </p:spPr>
+        <p:style>
+          <a:lnRef idx="1">
+            <a:schemeClr val="accent1"/>
+          </a:lnRef>
+          <a:fillRef idx="0">
+            <a:schemeClr val="accent1"/>
+          </a:fillRef>
+          <a:effectRef idx="0">
+            <a:schemeClr val="accent1"/>
+          </a:effectRef>
+          <a:fontRef idx="minor">
+            <a:schemeClr val="tx1"/>
+          </a:fontRef>
+        </p:style>
+      </p:cxnSp>
+      <p:cxnSp>
+        <p:nvCxnSpPr>
+          <p:cNvPr id="10" name="직선 연결선 9">
+            <a:extLst>
+              <a:ext uri="{FF2B5EF4-FFF2-40B4-BE49-F238E27FC236}">
+                <a16:creationId xmlns:a16="http://schemas.microsoft.com/office/drawing/2014/main" id="{FF13372B-D1D6-8E2B-4A64-06627BB3FF36}"/>
+              </a:ext>
+            </a:extLst>
+          </p:cNvPr>
+          <p:cNvCxnSpPr>
+            <a:cxnSpLocks/>
+          </p:cNvCxnSpPr>
+          <p:nvPr/>
+        </p:nvCxnSpPr>
+        <p:spPr>
+          <a:xfrm flipH="1" flipV="1">
+            <a:off x="1754538" y="2800553"/>
+            <a:ext cx="331435" cy="225006"/>
+          </a:xfrm>
+          <a:prstGeom prst="line">
+            <a:avLst/>
+          </a:prstGeom>
+          <a:ln>
+            <a:solidFill>
+              <a:srgbClr val="FF0000"/>
+            </a:solidFill>
+          </a:ln>
+        </p:spPr>
+        <p:style>
+          <a:lnRef idx="1">
+            <a:schemeClr val="accent1"/>
+          </a:lnRef>
+          <a:fillRef idx="0">
+            <a:schemeClr val="accent1"/>
+          </a:fillRef>
+          <a:effectRef idx="0">
+            <a:schemeClr val="accent1"/>
+          </a:effectRef>
+          <a:fontRef idx="minor">
+            <a:schemeClr val="tx1"/>
+          </a:fontRef>
+        </p:style>
+      </p:cxnSp>
+      <p:cxnSp>
+        <p:nvCxnSpPr>
+          <p:cNvPr id="17" name="직선 연결선 16">
+            <a:extLst>
+              <a:ext uri="{FF2B5EF4-FFF2-40B4-BE49-F238E27FC236}">
+                <a16:creationId xmlns:a16="http://schemas.microsoft.com/office/drawing/2014/main" id="{B86EFC22-EAD1-625D-4324-36D0BBA67457}"/>
+              </a:ext>
+            </a:extLst>
+          </p:cNvPr>
+          <p:cNvCxnSpPr/>
+          <p:nvPr/>
+        </p:nvCxnSpPr>
+        <p:spPr>
+          <a:xfrm flipV="1">
+            <a:off x="1987485" y="4779455"/>
+            <a:ext cx="350044" cy="253785"/>
+          </a:xfrm>
+          <a:prstGeom prst="line">
+            <a:avLst/>
+          </a:prstGeom>
+          <a:ln>
+            <a:solidFill>
+              <a:srgbClr val="FF0000"/>
+            </a:solidFill>
+          </a:ln>
+        </p:spPr>
+        <p:style>
+          <a:lnRef idx="1">
+            <a:schemeClr val="accent1"/>
+          </a:lnRef>
+          <a:fillRef idx="0">
+            <a:schemeClr val="accent1"/>
+          </a:fillRef>
+          <a:effectRef idx="0">
+            <a:schemeClr val="accent1"/>
+          </a:effectRef>
+          <a:fontRef idx="minor">
+            <a:schemeClr val="tx1"/>
+          </a:fontRef>
+        </p:style>
+      </p:cxnSp>
+      <p:cxnSp>
+        <p:nvCxnSpPr>
+          <p:cNvPr id="18" name="직선 연결선 17">
+            <a:extLst>
+              <a:ext uri="{FF2B5EF4-FFF2-40B4-BE49-F238E27FC236}">
+                <a16:creationId xmlns:a16="http://schemas.microsoft.com/office/drawing/2014/main" id="{A424C4A7-45C7-37A9-74C8-AD596E328670}"/>
+              </a:ext>
+            </a:extLst>
+          </p:cNvPr>
+          <p:cNvCxnSpPr>
+            <a:cxnSpLocks/>
+          </p:cNvCxnSpPr>
+          <p:nvPr/>
+        </p:nvCxnSpPr>
+        <p:spPr>
+          <a:xfrm flipH="1" flipV="1">
+            <a:off x="1987485" y="4808234"/>
+            <a:ext cx="331435" cy="225006"/>
+          </a:xfrm>
+          <a:prstGeom prst="line">
+            <a:avLst/>
+          </a:prstGeom>
+          <a:ln>
+            <a:solidFill>
+              <a:srgbClr val="FF0000"/>
+            </a:solidFill>
+          </a:ln>
+        </p:spPr>
+        <p:style>
+          <a:lnRef idx="1">
+            <a:schemeClr val="accent1"/>
+          </a:lnRef>
+          <a:fillRef idx="0">
+            <a:schemeClr val="accent1"/>
+          </a:fillRef>
+          <a:effectRef idx="0">
+            <a:schemeClr val="accent1"/>
+          </a:effectRef>
+          <a:fontRef idx="minor">
+            <a:schemeClr val="tx1"/>
+          </a:fontRef>
+        </p:style>
+      </p:cxnSp>
     </p:spTree>
     <p:extLst>
       <p:ext uri="{BB962C8B-B14F-4D97-AF65-F5344CB8AC3E}">
@@ -5464,8 +5632,8 @@
         </p:nvSpPr>
         <p:spPr>
           <a:xfrm>
-            <a:off x="7730581" y="5848161"/>
-            <a:ext cx="514826" cy="220468"/>
+            <a:off x="7876641" y="5590019"/>
+            <a:ext cx="243312" cy="213431"/>
           </a:xfrm>
           <a:prstGeom prst="rect">
             <a:avLst/>
@@ -5887,7 +6055,7 @@
         </p:nvSpPr>
         <p:spPr>
           <a:xfrm>
-            <a:off x="6469354" y="4943627"/>
+            <a:off x="6625597" y="4807140"/>
             <a:ext cx="853305" cy="857330"/>
           </a:xfrm>
           <a:prstGeom prst="rect">
@@ -5986,7 +6154,7 @@
         </p:nvSpPr>
         <p:spPr>
           <a:xfrm>
-            <a:off x="7386566" y="5184894"/>
+            <a:off x="7515144" y="4935359"/>
             <a:ext cx="668633" cy="249535"/>
           </a:xfrm>
           <a:prstGeom prst="rect">
@@ -6020,7 +6188,7 @@
           <a:lstStyle/>
           <a:p>
             <a:pPr algn="ctr"/>
-            <a:endParaRPr lang="ko-KR" altLang="en-US"/>
+            <a:endParaRPr lang="ko-KR" altLang="en-US" dirty="0"/>
           </a:p>
         </p:txBody>
       </p:sp>
@@ -6038,7 +6206,7 @@
         </p:nvSpPr>
         <p:spPr>
           <a:xfrm>
-            <a:off x="7398082" y="5491909"/>
+            <a:off x="7478902" y="5197203"/>
             <a:ext cx="657118" cy="249535"/>
           </a:xfrm>
           <a:prstGeom prst="rect">
@@ -6190,7 +6358,7 @@
                   <a:srgbClr val="FF0000"/>
                 </a:solidFill>
               </a:rPr>
-              <a:t>v1.2.0</a:t>
+              <a:t>v1.2.1</a:t>
             </a:r>
             <a:r>
               <a:rPr lang="en-US" altLang="ko-KR" i="1" dirty="0"/>
@@ -6274,7 +6442,7 @@
         <p:spPr>
           <a:xfrm>
             <a:off x="3926928" y="5775480"/>
-            <a:ext cx="1642160" cy="323165"/>
+            <a:ext cx="1642160" cy="553998"/>
           </a:xfrm>
           <a:prstGeom prst="rect">
             <a:avLst/>
@@ -6303,6 +6471,19 @@
               </a:rPr>
               <a:t>약물 명 입력</a:t>
             </a:r>
+            <a:r>
+              <a:rPr lang="en-US" altLang="ko-KR" sz="1500" dirty="0">
+                <a:solidFill>
+                  <a:srgbClr val="FF0000"/>
+                </a:solidFill>
+              </a:rPr>
+              <a:t>(deprecated)</a:t>
+            </a:r>
+            <a:endParaRPr lang="ko-KR" altLang="en-US" sz="1500" dirty="0">
+              <a:solidFill>
+                <a:srgbClr val="FF0000"/>
+              </a:solidFill>
+            </a:endParaRPr>
           </a:p>
         </p:txBody>
       </p:sp>
@@ -6457,6 +6638,92 @@
           </a:p>
         </p:txBody>
       </p:sp>
+      <p:cxnSp>
+        <p:nvCxnSpPr>
+          <p:cNvPr id="2" name="직선 연결선 1">
+            <a:extLst>
+              <a:ext uri="{FF2B5EF4-FFF2-40B4-BE49-F238E27FC236}">
+                <a16:creationId xmlns:a16="http://schemas.microsoft.com/office/drawing/2014/main" id="{4FD67165-EA48-C4AD-BABD-4A3234333261}"/>
+              </a:ext>
+            </a:extLst>
+          </p:cNvPr>
+          <p:cNvCxnSpPr>
+            <a:cxnSpLocks/>
+          </p:cNvCxnSpPr>
+          <p:nvPr/>
+        </p:nvCxnSpPr>
+        <p:spPr>
+          <a:xfrm flipV="1">
+            <a:off x="4059514" y="4957449"/>
+            <a:ext cx="2310674" cy="843508"/>
+          </a:xfrm>
+          <a:prstGeom prst="line">
+            <a:avLst/>
+          </a:prstGeom>
+          <a:ln>
+            <a:solidFill>
+              <a:srgbClr val="FF0000"/>
+            </a:solidFill>
+          </a:ln>
+        </p:spPr>
+        <p:style>
+          <a:lnRef idx="1">
+            <a:schemeClr val="accent1"/>
+          </a:lnRef>
+          <a:fillRef idx="0">
+            <a:schemeClr val="accent1"/>
+          </a:fillRef>
+          <a:effectRef idx="0">
+            <a:schemeClr val="accent1"/>
+          </a:effectRef>
+          <a:fontRef idx="minor">
+            <a:schemeClr val="tx1"/>
+          </a:fontRef>
+        </p:style>
+      </p:cxnSp>
+      <p:cxnSp>
+        <p:nvCxnSpPr>
+          <p:cNvPr id="6" name="직선 연결선 5">
+            <a:extLst>
+              <a:ext uri="{FF2B5EF4-FFF2-40B4-BE49-F238E27FC236}">
+                <a16:creationId xmlns:a16="http://schemas.microsoft.com/office/drawing/2014/main" id="{130C7487-50D2-D6D6-D44D-E08CD64D3DD9}"/>
+              </a:ext>
+            </a:extLst>
+          </p:cNvPr>
+          <p:cNvCxnSpPr>
+            <a:cxnSpLocks/>
+          </p:cNvCxnSpPr>
+          <p:nvPr/>
+        </p:nvCxnSpPr>
+        <p:spPr>
+          <a:xfrm flipH="1" flipV="1">
+            <a:off x="4264928" y="5062291"/>
+            <a:ext cx="2074328" cy="696590"/>
+          </a:xfrm>
+          <a:prstGeom prst="line">
+            <a:avLst/>
+          </a:prstGeom>
+          <a:ln>
+            <a:solidFill>
+              <a:srgbClr val="FF0000"/>
+            </a:solidFill>
+          </a:ln>
+        </p:spPr>
+        <p:style>
+          <a:lnRef idx="1">
+            <a:schemeClr val="accent1"/>
+          </a:lnRef>
+          <a:fillRef idx="0">
+            <a:schemeClr val="accent1"/>
+          </a:fillRef>
+          <a:effectRef idx="0">
+            <a:schemeClr val="accent1"/>
+          </a:effectRef>
+          <a:fontRef idx="minor">
+            <a:schemeClr val="tx1"/>
+          </a:fontRef>
+        </p:style>
+      </p:cxnSp>
     </p:spTree>
     <p:extLst>
       <p:ext uri="{BB962C8B-B14F-4D97-AF65-F5344CB8AC3E}">

</xml_diff>